<commit_message>
Change in intro slide deck and create PPT theme
</commit_message>
<xml_diff>
--- a/20200311/_bepug/meetupMarch2020-intro.pptx
+++ b/20200311/_bepug/meetupMarch2020-intro.pptx
@@ -162,6 +162,9 @@
     </p:ext>
     <p:ext uri="{EFAFB233-063F-42B5-8137-9DF3F51BA10A}">
       <p15:sldGuideLst xmlns:p15="http://schemas.microsoft.com/office/powerpoint/2012/main"/>
+    </p:ext>
+    <p:ext uri="{2D200454-40CA-4A62-9FC3-DE9A4176ACB9}">
+      <p15:notesGuideLst xmlns:p15="http://schemas.microsoft.com/office/powerpoint/2012/main"/>
     </p:ext>
   </p:extLst>
 </p:presentation>
@@ -7383,7 +7386,13 @@
       </p:grpSpPr>
       <p:sp>
         <p:nvSpPr>
-          <p:cNvPr id="2" name="Title 1"/>
+          <p:cNvPr id="7" name="Titel 6">
+            <a:extLst>
+              <a:ext uri="{FF2B5EF4-FFF2-40B4-BE49-F238E27FC236}">
+                <a16:creationId xmlns:a16="http://schemas.microsoft.com/office/drawing/2014/main" id="{CF73D5A4-E797-4305-B6F2-9F3B2D17EE74}"/>
+              </a:ext>
+            </a:extLst>
+          </p:cNvPr>
           <p:cNvSpPr>
             <a:spLocks noGrp="1"/>
           </p:cNvSpPr>
@@ -7391,41 +7400,84 @@
             <p:ph type="title"/>
           </p:nvPr>
         </p:nvSpPr>
-        <p:spPr/>
-        <p:txBody>
-          <a:bodyPr anchor="ctr">
+        <p:spPr>
+          <a:xfrm>
+            <a:off x="838200" y="365125"/>
+            <a:ext cx="10515600" cy="1325563"/>
+          </a:xfrm>
+          <a:prstGeom prst="rect">
+            <a:avLst/>
+          </a:prstGeom>
+        </p:spPr>
+        <p:txBody>
+          <a:bodyPr vert="horz" lIns="91440" tIns="45720" rIns="91440" bIns="45720" rtlCol="0" anchor="ctr">
             <a:normAutofit/>
           </a:bodyPr>
           <a:lstStyle/>
           <a:p>
-            <a:pPr algn="ctr"/>
-            <a:r>
-              <a:rPr lang="fr-BE" sz="9600" dirty="0" err="1"/>
-              <a:t>Welcome</a:t>
-            </a:r>
-            <a:endParaRPr lang="en-US" sz="9600" dirty="0"/>
-          </a:p>
-        </p:txBody>
-      </p:sp>
-      <p:sp>
-        <p:nvSpPr>
-          <p:cNvPr id="3" name="Text Placeholder 2"/>
-          <p:cNvSpPr>
-            <a:spLocks noGrp="1"/>
-          </p:cNvSpPr>
-          <p:nvPr>
-            <p:ph type="body" idx="1"/>
-          </p:nvPr>
-        </p:nvSpPr>
-        <p:spPr/>
-        <p:txBody>
-          <a:bodyPr/>
-          <a:lstStyle/>
-          <a:p>
-            <a:endParaRPr lang="en-US"/>
-          </a:p>
-        </p:txBody>
-      </p:sp>
+            <a:r>
+              <a:rPr lang="en-US" b="1" kern="1200" cap="none" spc="0">
+                <a:ln w="12700" cmpd="sng">
+                  <a:solidFill>
+                    <a:schemeClr val="accent4"/>
+                  </a:solidFill>
+                  <a:prstDash val="solid"/>
+                </a:ln>
+                <a:effectLst/>
+              </a:rPr>
+              <a:t>Thanks to our sponsor!</a:t>
+            </a:r>
+          </a:p>
+        </p:txBody>
+      </p:sp>
+      <p:pic>
+        <p:nvPicPr>
+          <p:cNvPr id="4" name="Picture 2" descr="Image result for ob-v-us">
+            <a:extLst>
+              <a:ext uri="{FF2B5EF4-FFF2-40B4-BE49-F238E27FC236}">
+                <a16:creationId xmlns:a16="http://schemas.microsoft.com/office/drawing/2014/main" id="{383F79BE-6BC8-4F0F-B038-82E5EE19F88F}"/>
+              </a:ext>
+            </a:extLst>
+          </p:cNvPr>
+          <p:cNvPicPr>
+            <a:picLocks noChangeAspect="1" noChangeArrowheads="1"/>
+          </p:cNvPicPr>
+          <p:nvPr/>
+        </p:nvPicPr>
+        <p:blipFill>
+          <a:blip r:embed="rId3">
+            <a:extLst>
+              <a:ext uri="{28A0092B-C50C-407E-A947-70E740481C1C}">
+                <a14:useLocalDpi xmlns:a14="http://schemas.microsoft.com/office/drawing/2010/main" val="0"/>
+              </a:ext>
+            </a:extLst>
+          </a:blip>
+          <a:stretch>
+            <a:fillRect/>
+          </a:stretch>
+        </p:blipFill>
+        <p:spPr bwMode="auto">
+          <a:xfrm>
+            <a:off x="838200" y="2515965"/>
+            <a:ext cx="10515600" cy="2970657"/>
+          </a:xfrm>
+          <a:prstGeom prst="rect">
+            <a:avLst/>
+          </a:prstGeom>
+          <a:solidFill>
+            <a:srgbClr val="FFFFFF"/>
+          </a:solidFill>
+          <a:extLst>
+            <a:ext uri="{909E8E84-426E-40DD-AFC4-6F175D3DCCD1}">
+              <a14:hiddenFill xmlns:a14="http://schemas.microsoft.com/office/drawing/2010/main">
+                <a:solidFill>
+                  <a:srgbClr val="FFFFFF"/>
+                </a:solidFill>
+              </a14:hiddenFill>
+            </a:ext>
+          </a:extLst>
+        </p:spPr>
+      </p:pic>
     </p:spTree>
     <p:extLst>
       <p:ext uri="{BB962C8B-B14F-4D97-AF65-F5344CB8AC3E}">
@@ -7522,8 +7574,8 @@
           </a:fontRef>
         </p:style>
       </p:cxnSp>
-      <mc:AlternateContent xmlns:mc="http://schemas.openxmlformats.org/markup-compatibility/2006">
-        <mc:Choice xmlns:psez="http://schemas.microsoft.com/office/powerpoint/2016/sectionzoom" Requires="psez">
+      <mc:AlternateContent xmlns:mc="http://schemas.openxmlformats.org/markup-compatibility/2006" xmlns:psez="http://schemas.microsoft.com/office/powerpoint/2016/sectionzoom">
+        <mc:Choice Requires="psez">
           <p:graphicFrame>
             <p:nvGraphicFramePr>
               <p:cNvPr id="20" name="Sectiezoom 19">
@@ -7575,7 +7627,7 @@
             </a:graphic>
           </p:graphicFrame>
         </mc:Choice>
-        <mc:Fallback>
+        <mc:Fallback xmlns="">
           <p:pic>
             <p:nvPicPr>
               <p:cNvPr id="20" name="Sectiezoom 19">
@@ -7592,7 +7644,7 @@
               <p:nvPr/>
             </p:nvPicPr>
             <p:blipFill>
-              <a:blip r:embed="rId3"/>
+              <a:blip r:embed="rId5"/>
               <a:stretch>
                 <a:fillRect/>
               </a:stretch>
@@ -7609,8 +7661,8 @@
           </p:pic>
         </mc:Fallback>
       </mc:AlternateContent>
-      <mc:AlternateContent xmlns:mc="http://schemas.openxmlformats.org/markup-compatibility/2006">
-        <mc:Choice xmlns:psez="http://schemas.microsoft.com/office/powerpoint/2016/sectionzoom" Requires="psez">
+      <mc:AlternateContent xmlns:mc="http://schemas.openxmlformats.org/markup-compatibility/2006" xmlns:psez="http://schemas.microsoft.com/office/powerpoint/2016/sectionzoom">
+        <mc:Choice Requires="psez">
           <p:graphicFrame>
             <p:nvGraphicFramePr>
               <p:cNvPr id="22" name="Sectiezoom 21">
@@ -7641,7 +7693,7 @@
                   <psez:sectionZmObj sectionId="{45D42E1A-81EE-48F2-9B99-D6A47D13B192}">
                     <psez:zmPr id="{A6C3F194-4EC1-44C7-B9B9-953A5F919385}" transitionDur="1000">
                       <p166:blipFill xmlns:p166="http://schemas.microsoft.com/office/powerpoint/2016/6/main">
-                        <a:blip r:embed="rId5"/>
+                        <a:blip r:embed="rId6"/>
                         <a:stretch>
                           <a:fillRect/>
                         </a:stretch>
@@ -7662,11 +7714,11 @@
             </a:graphic>
           </p:graphicFrame>
         </mc:Choice>
-        <mc:Fallback>
+        <mc:Fallback xmlns="">
           <p:pic>
             <p:nvPicPr>
               <p:cNvPr id="22" name="Sectiezoom 21">
-                <a:hlinkClick r:id="rId6" action="ppaction://hlinksldjump"/>
+                <a:hlinkClick r:id="rId7" action="ppaction://hlinksldjump"/>
                 <a:extLst>
                   <a:ext uri="{FF2B5EF4-FFF2-40B4-BE49-F238E27FC236}">
                     <a16:creationId xmlns:a16="http://schemas.microsoft.com/office/drawing/2014/main" id="{719EE715-4AC8-4196-BA65-048DF9471B6F}"/>
@@ -7679,7 +7731,7 @@
               <p:nvPr/>
             </p:nvPicPr>
             <p:blipFill>
-              <a:blip r:embed="rId5"/>
+              <a:blip r:embed="rId8"/>
               <a:stretch>
                 <a:fillRect/>
               </a:stretch>
@@ -7696,8 +7748,8 @@
           </p:pic>
         </mc:Fallback>
       </mc:AlternateContent>
-      <mc:AlternateContent xmlns:mc="http://schemas.openxmlformats.org/markup-compatibility/2006">
-        <mc:Choice xmlns:psez="http://schemas.microsoft.com/office/powerpoint/2016/sectionzoom" Requires="psez">
+      <mc:AlternateContent xmlns:mc="http://schemas.openxmlformats.org/markup-compatibility/2006" xmlns:psez="http://schemas.microsoft.com/office/powerpoint/2016/sectionzoom">
+        <mc:Choice Requires="psez">
           <p:graphicFrame>
             <p:nvGraphicFramePr>
               <p:cNvPr id="24" name="Sectiezoom 23">
@@ -7728,7 +7780,7 @@
                   <psez:sectionZmObj sectionId="{15C88A28-A44A-4497-B8E3-29BFCC9CC522}">
                     <psez:zmPr id="{8756A952-C829-47E2-A20D-0B6C66E99CD0}" transitionDur="1000">
                       <p166:blipFill xmlns:p166="http://schemas.microsoft.com/office/powerpoint/2016/6/main">
-                        <a:blip r:embed="rId7"/>
+                        <a:blip r:embed="rId9"/>
                         <a:stretch>
                           <a:fillRect/>
                         </a:stretch>
@@ -7749,11 +7801,11 @@
             </a:graphic>
           </p:graphicFrame>
         </mc:Choice>
-        <mc:Fallback>
+        <mc:Fallback xmlns="">
           <p:pic>
             <p:nvPicPr>
               <p:cNvPr id="24" name="Sectiezoom 23">
-                <a:hlinkClick r:id="rId8" action="ppaction://hlinksldjump"/>
+                <a:hlinkClick r:id="rId10" action="ppaction://hlinksldjump"/>
                 <a:extLst>
                   <a:ext uri="{FF2B5EF4-FFF2-40B4-BE49-F238E27FC236}">
                     <a16:creationId xmlns:a16="http://schemas.microsoft.com/office/drawing/2014/main" id="{B329B84B-82EC-41B3-BD09-9A7CB3048D93}"/>
@@ -7766,7 +7818,7 @@
               <p:nvPr/>
             </p:nvPicPr>
             <p:blipFill>
-              <a:blip r:embed="rId7"/>
+              <a:blip r:embed="rId11"/>
               <a:stretch>
                 <a:fillRect/>
               </a:stretch>
@@ -7783,8 +7835,8 @@
           </p:pic>
         </mc:Fallback>
       </mc:AlternateContent>
-      <mc:AlternateContent xmlns:mc="http://schemas.openxmlformats.org/markup-compatibility/2006">
-        <mc:Choice xmlns:psez="http://schemas.microsoft.com/office/powerpoint/2016/sectionzoom" Requires="psez">
+      <mc:AlternateContent xmlns:mc="http://schemas.openxmlformats.org/markup-compatibility/2006" xmlns:psez="http://schemas.microsoft.com/office/powerpoint/2016/sectionzoom">
+        <mc:Choice Requires="psez">
           <p:graphicFrame>
             <p:nvGraphicFramePr>
               <p:cNvPr id="26" name="Sectiezoom 25">
@@ -7815,7 +7867,7 @@
                   <psez:sectionZmObj sectionId="{84BA295D-6A04-4666-BC36-576F0E65C5E8}">
                     <psez:zmPr id="{CCB9C39F-278E-49E6-A2F8-86806DAEB0AA}" transitionDur="1000">
                       <p166:blipFill xmlns:p166="http://schemas.microsoft.com/office/powerpoint/2016/6/main">
-                        <a:blip r:embed="rId9"/>
+                        <a:blip r:embed="rId12"/>
                         <a:stretch>
                           <a:fillRect/>
                         </a:stretch>
@@ -7836,11 +7888,11 @@
             </a:graphic>
           </p:graphicFrame>
         </mc:Choice>
-        <mc:Fallback>
+        <mc:Fallback xmlns="">
           <p:pic>
             <p:nvPicPr>
               <p:cNvPr id="26" name="Sectiezoom 25">
-                <a:hlinkClick r:id="rId10" action="ppaction://hlinksldjump"/>
+                <a:hlinkClick r:id="rId13" action="ppaction://hlinksldjump"/>
                 <a:extLst>
                   <a:ext uri="{FF2B5EF4-FFF2-40B4-BE49-F238E27FC236}">
                     <a16:creationId xmlns:a16="http://schemas.microsoft.com/office/drawing/2014/main" id="{EB82BE9D-453F-49FD-97CC-2C21A1AD31F5}"/>
@@ -7853,7 +7905,7 @@
               <p:nvPr/>
             </p:nvPicPr>
             <p:blipFill>
-              <a:blip r:embed="rId9"/>
+              <a:blip r:embed="rId14"/>
               <a:stretch>
                 <a:fillRect/>
               </a:stretch>
@@ -7870,8 +7922,8 @@
           </p:pic>
         </mc:Fallback>
       </mc:AlternateContent>
-      <mc:AlternateContent xmlns:mc="http://schemas.openxmlformats.org/markup-compatibility/2006">
-        <mc:Choice xmlns:pslz="http://schemas.microsoft.com/office/powerpoint/2016/slidezoom" Requires="pslz">
+      <mc:AlternateContent xmlns:mc="http://schemas.openxmlformats.org/markup-compatibility/2006" xmlns:pslz="http://schemas.microsoft.com/office/powerpoint/2016/slidezoom">
+        <mc:Choice Requires="pslz">
           <p:graphicFrame>
             <p:nvGraphicFramePr>
               <p:cNvPr id="32" name="Diazoom 31">
@@ -7902,7 +7954,7 @@
                   <pslz:sldZmObj sldId="272" cId="3601706899">
                     <pslz:zmPr id="{9B8FD90E-C7F2-46DA-8618-197E630E7FAF}" returnToParent="0" transitionDur="1000">
                       <p166:blipFill xmlns:p166="http://schemas.microsoft.com/office/powerpoint/2016/6/main">
-                        <a:blip r:embed="rId11"/>
+                        <a:blip r:embed="rId15"/>
                         <a:stretch>
                           <a:fillRect/>
                         </a:stretch>
@@ -7923,11 +7975,11 @@
             </a:graphic>
           </p:graphicFrame>
         </mc:Choice>
-        <mc:Fallback>
+        <mc:Fallback xmlns="">
           <p:pic>
             <p:nvPicPr>
               <p:cNvPr id="32" name="Diazoom 31">
-                <a:hlinkClick r:id="rId12" action="ppaction://hlinksldjump"/>
+                <a:hlinkClick r:id="rId16" action="ppaction://hlinksldjump"/>
                 <a:extLst>
                   <a:ext uri="{FF2B5EF4-FFF2-40B4-BE49-F238E27FC236}">
                     <a16:creationId xmlns:a16="http://schemas.microsoft.com/office/drawing/2014/main" id="{7914567E-06EB-4FB9-9227-9CDA1424E6C9}"/>
@@ -7940,7 +7992,7 @@
               <p:nvPr/>
             </p:nvPicPr>
             <p:blipFill>
-              <a:blip r:embed="rId11"/>
+              <a:blip r:embed="rId17"/>
               <a:stretch>
                 <a:fillRect/>
               </a:stretch>

</xml_diff>

<commit_message>
Add notes on PowerPoint security override
</commit_message>
<xml_diff>
--- a/20200311/_bepug/meetupMarch2020-intro.pptx
+++ b/20200311/_bepug/meetupMarch2020-intro.pptx
@@ -252,7 +252,7 @@
           <a:p>
             <a:fld id="{D6D22A75-D744-4AC6-9BBA-81530B851BBD}" type="datetimeFigureOut">
               <a:rPr lang="en-GB" smtClean="0"/>
-              <a:t>08/03/2020</a:t>
+              <a:t>10/03/2020</a:t>
             </a:fld>
             <a:endParaRPr lang="en-GB"/>
           </a:p>
@@ -411,7 +411,7 @@
           <a:p>
             <a:fld id="{99987E16-5505-4375-9178-8D71AB578D8B}" type="slidenum">
               <a:rPr lang="en-GB" smtClean="0"/>
-              <a:t>‹nr.›</a:t>
+              <a:t>‹#›</a:t>
             </a:fld>
             <a:endParaRPr lang="en-GB"/>
           </a:p>
@@ -587,16 +587,8 @@
               <a:t># </a:t>
             </a:r>
             <a:r>
-              <a:rPr lang="en-GB" i="1"/>
-              <a:t>http</a:t>
-            </a:r>
-            <a:r>
               <a:rPr lang="en-GB" i="1" dirty="0"/>
-              <a:t>://soundbible.com/grab.php?id=2148&amp;type</a:t>
-            </a:r>
-            <a:r>
-              <a:rPr lang="en-GB" i="1"/>
-              <a:t>=wav</a:t>
+              <a:t>http://soundbible.com/grab.php?id=2148&amp;type=wav</a:t>
             </a:r>
             <a:endParaRPr lang="en-GB" dirty="0"/>
           </a:p>
@@ -614,6 +606,27 @@
           </a:p>
           <a:p>
             <a:endParaRPr lang="en-US" dirty="0"/>
+          </a:p>
+          <a:p>
+            <a:r>
+              <a:rPr lang="en-US" dirty="0" err="1"/>
+              <a:t>sp</a:t>
+            </a:r>
+            <a:r>
+              <a:rPr lang="en-US" dirty="0"/>
+              <a:t> HKCU:\Software\Microsoft\Office\16.0\PowerPoint\Security\ -Name </a:t>
+            </a:r>
+            <a:r>
+              <a:rPr lang="en-US" dirty="0" err="1"/>
+              <a:t>RunPrograms</a:t>
+            </a:r>
+            <a:r>
+              <a:rPr lang="en-US"/>
+              <a:t> -Value 1</a:t>
+            </a:r>
+            <a:endParaRPr lang="en-GB" dirty="0">
+              <a:hlinkClick r:id="rId3"/>
+            </a:endParaRPr>
           </a:p>
           <a:p>
             <a:r>
@@ -622,6 +635,9 @@
               </a:rPr>
               <a:t>https://support.office.com/en-us/article/-run-programs-custom-action-is-disabled-in-powerpoint-2016-7607b815-675b-470c-8099-823c66d3a367</a:t>
             </a:r>
+            <a:endParaRPr lang="en-GB" dirty="0"/>
+          </a:p>
+          <a:p>
             <a:endParaRPr lang="en-GB" dirty="0"/>
           </a:p>
         </p:txBody>
@@ -958,7 +974,7 @@
           <a:bodyPr/>
           <a:lstStyle/>
           <a:p>
-            <a:endParaRPr lang="en-GB"/>
+            <a:endParaRPr lang="en-GB" dirty="0"/>
           </a:p>
         </p:txBody>
       </p:sp>
@@ -1905,7 +1921,7 @@
           <a:p>
             <a:fld id="{C3E7B4AA-2A30-485C-AB14-4F6EF9C89897}" type="datetimeFigureOut">
               <a:rPr lang="en-GB" smtClean="0"/>
-              <a:t>08/03/2020</a:t>
+              <a:t>10/03/2020</a:t>
             </a:fld>
             <a:endParaRPr lang="en-GB"/>
           </a:p>
@@ -1959,7 +1975,7 @@
           <a:p>
             <a:fld id="{50DCA0E4-055D-4D79-BDF8-BB27C910D4FA}" type="slidenum">
               <a:rPr lang="en-GB" smtClean="0"/>
-              <a:t>‹nr.›</a:t>
+              <a:t>‹#›</a:t>
             </a:fld>
             <a:endParaRPr lang="en-GB"/>
           </a:p>
@@ -2105,7 +2121,7 @@
           <a:p>
             <a:fld id="{C3E7B4AA-2A30-485C-AB14-4F6EF9C89897}" type="datetimeFigureOut">
               <a:rPr lang="en-GB" smtClean="0"/>
-              <a:t>08/03/2020</a:t>
+              <a:t>10/03/2020</a:t>
             </a:fld>
             <a:endParaRPr lang="en-GB"/>
           </a:p>
@@ -2159,7 +2175,7 @@
           <a:p>
             <a:fld id="{50DCA0E4-055D-4D79-BDF8-BB27C910D4FA}" type="slidenum">
               <a:rPr lang="en-GB" smtClean="0"/>
-              <a:t>‹nr.›</a:t>
+              <a:t>‹#›</a:t>
             </a:fld>
             <a:endParaRPr lang="en-GB"/>
           </a:p>
@@ -2381,7 +2397,7 @@
           <a:p>
             <a:fld id="{C3E7B4AA-2A30-485C-AB14-4F6EF9C89897}" type="datetimeFigureOut">
               <a:rPr lang="en-GB" smtClean="0"/>
-              <a:t>08/03/2020</a:t>
+              <a:t>10/03/2020</a:t>
             </a:fld>
             <a:endParaRPr lang="en-GB"/>
           </a:p>
@@ -2435,7 +2451,7 @@
           <a:p>
             <a:fld id="{50DCA0E4-055D-4D79-BDF8-BB27C910D4FA}" type="slidenum">
               <a:rPr lang="en-GB" smtClean="0"/>
-              <a:t>‹nr.›</a:t>
+              <a:t>‹#›</a:t>
             </a:fld>
             <a:endParaRPr lang="en-GB"/>
           </a:p>
@@ -2649,7 +2665,7 @@
           <a:p>
             <a:fld id="{C3E7B4AA-2A30-485C-AB14-4F6EF9C89897}" type="datetimeFigureOut">
               <a:rPr lang="en-GB" smtClean="0"/>
-              <a:t>08/03/2020</a:t>
+              <a:t>10/03/2020</a:t>
             </a:fld>
             <a:endParaRPr lang="en-GB"/>
           </a:p>
@@ -2703,7 +2719,7 @@
           <a:p>
             <a:fld id="{50DCA0E4-055D-4D79-BDF8-BB27C910D4FA}" type="slidenum">
               <a:rPr lang="en-GB" smtClean="0"/>
-              <a:t>‹nr.›</a:t>
+              <a:t>‹#›</a:t>
             </a:fld>
             <a:endParaRPr lang="en-GB"/>
           </a:p>
@@ -3064,7 +3080,7 @@
           <a:p>
             <a:fld id="{C3E7B4AA-2A30-485C-AB14-4F6EF9C89897}" type="datetimeFigureOut">
               <a:rPr lang="en-GB" smtClean="0"/>
-              <a:t>08/03/2020</a:t>
+              <a:t>10/03/2020</a:t>
             </a:fld>
             <a:endParaRPr lang="en-GB"/>
           </a:p>
@@ -3118,7 +3134,7 @@
           <a:p>
             <a:fld id="{50DCA0E4-055D-4D79-BDF8-BB27C910D4FA}" type="slidenum">
               <a:rPr lang="en-GB" smtClean="0"/>
-              <a:t>‹nr.›</a:t>
+              <a:t>‹#›</a:t>
             </a:fld>
             <a:endParaRPr lang="en-GB"/>
           </a:p>
@@ -3206,7 +3222,7 @@
           <a:p>
             <a:fld id="{C3E7B4AA-2A30-485C-AB14-4F6EF9C89897}" type="datetimeFigureOut">
               <a:rPr lang="en-GB" smtClean="0"/>
-              <a:t>08/03/2020</a:t>
+              <a:t>10/03/2020</a:t>
             </a:fld>
             <a:endParaRPr lang="en-GB"/>
           </a:p>
@@ -3260,7 +3276,7 @@
           <a:p>
             <a:fld id="{50DCA0E4-055D-4D79-BDF8-BB27C910D4FA}" type="slidenum">
               <a:rPr lang="en-GB" smtClean="0"/>
-              <a:t>‹nr.›</a:t>
+              <a:t>‹#›</a:t>
             </a:fld>
             <a:endParaRPr lang="en-GB"/>
           </a:p>
@@ -3319,7 +3335,7 @@
           <a:p>
             <a:fld id="{C3E7B4AA-2A30-485C-AB14-4F6EF9C89897}" type="datetimeFigureOut">
               <a:rPr lang="en-GB" smtClean="0"/>
-              <a:t>08/03/2020</a:t>
+              <a:t>10/03/2020</a:t>
             </a:fld>
             <a:endParaRPr lang="en-GB"/>
           </a:p>
@@ -3373,7 +3389,7 @@
           <a:p>
             <a:fld id="{50DCA0E4-055D-4D79-BDF8-BB27C910D4FA}" type="slidenum">
               <a:rPr lang="en-GB" smtClean="0"/>
-              <a:t>‹nr.›</a:t>
+              <a:t>‹#›</a:t>
             </a:fld>
             <a:endParaRPr lang="en-GB"/>
           </a:p>
@@ -3632,7 +3648,7 @@
           <a:p>
             <a:fld id="{C3E7B4AA-2A30-485C-AB14-4F6EF9C89897}" type="datetimeFigureOut">
               <a:rPr lang="en-GB" smtClean="0"/>
-              <a:t>08/03/2020</a:t>
+              <a:t>10/03/2020</a:t>
             </a:fld>
             <a:endParaRPr lang="en-GB"/>
           </a:p>
@@ -3686,7 +3702,7 @@
           <a:p>
             <a:fld id="{50DCA0E4-055D-4D79-BDF8-BB27C910D4FA}" type="slidenum">
               <a:rPr lang="en-GB" smtClean="0"/>
-              <a:t>‹nr.›</a:t>
+              <a:t>‹#›</a:t>
             </a:fld>
             <a:endParaRPr lang="en-GB"/>
           </a:p>
@@ -4043,7 +4059,7 @@
           <a:p>
             <a:fld id="{C3E7B4AA-2A30-485C-AB14-4F6EF9C89897}" type="datetimeFigureOut">
               <a:rPr lang="en-GB" smtClean="0"/>
-              <a:t>08/03/2020</a:t>
+              <a:t>10/03/2020</a:t>
             </a:fld>
             <a:endParaRPr lang="en-GB"/>
           </a:p>
@@ -4097,7 +4113,7 @@
           <a:p>
             <a:fld id="{50DCA0E4-055D-4D79-BDF8-BB27C910D4FA}" type="slidenum">
               <a:rPr lang="en-GB" smtClean="0"/>
-              <a:t>‹nr.›</a:t>
+              <a:t>‹#›</a:t>
             </a:fld>
             <a:endParaRPr lang="en-GB"/>
           </a:p>
@@ -4243,7 +4259,7 @@
           <a:p>
             <a:fld id="{C3E7B4AA-2A30-485C-AB14-4F6EF9C89897}" type="datetimeFigureOut">
               <a:rPr lang="en-GB" smtClean="0"/>
-              <a:t>08/03/2020</a:t>
+              <a:t>10/03/2020</a:t>
             </a:fld>
             <a:endParaRPr lang="en-GB"/>
           </a:p>
@@ -4297,7 +4313,7 @@
           <a:p>
             <a:fld id="{50DCA0E4-055D-4D79-BDF8-BB27C910D4FA}" type="slidenum">
               <a:rPr lang="en-GB" smtClean="0"/>
-              <a:t>‹nr.›</a:t>
+              <a:t>‹#›</a:t>
             </a:fld>
             <a:endParaRPr lang="en-GB"/>
           </a:p>
@@ -4453,7 +4469,7 @@
           <a:p>
             <a:fld id="{C3E7B4AA-2A30-485C-AB14-4F6EF9C89897}" type="datetimeFigureOut">
               <a:rPr lang="en-GB" smtClean="0"/>
-              <a:t>08/03/2020</a:t>
+              <a:t>10/03/2020</a:t>
             </a:fld>
             <a:endParaRPr lang="en-GB"/>
           </a:p>
@@ -4507,7 +4523,7 @@
           <a:p>
             <a:fld id="{50DCA0E4-055D-4D79-BDF8-BB27C910D4FA}" type="slidenum">
               <a:rPr lang="en-GB" smtClean="0"/>
-              <a:t>‹nr.›</a:t>
+              <a:t>‹#›</a:t>
             </a:fld>
             <a:endParaRPr lang="en-GB"/>
           </a:p>
@@ -5811,8 +5827,8 @@
           </a:p>
         </p:txBody>
       </p:sp>
-      <mc:AlternateContent xmlns:mc="http://schemas.openxmlformats.org/markup-compatibility/2006" xmlns:am3d="http://schemas.microsoft.com/office/drawing/2017/model3d">
-        <mc:Choice Requires="am3d">
+      <mc:AlternateContent xmlns:mc="http://schemas.openxmlformats.org/markup-compatibility/2006">
+        <mc:Choice xmlns:am3d="http://schemas.microsoft.com/office/drawing/2017/model3d" Requires="am3d">
           <p:graphicFrame>
             <p:nvGraphicFramePr>
               <p:cNvPr id="15" name="3D Model 7" descr="PowerShell 3D">
@@ -5908,7 +5924,7 @@
             </a:graphic>
           </p:graphicFrame>
         </mc:Choice>
-        <mc:Fallback xmlns="">
+        <mc:Fallback>
           <p:pic>
             <p:nvPicPr>
               <p:cNvPr id="15" name="3D Model 7" descr="PowerShell 3D">
@@ -5924,7 +5940,7 @@
               <p:nvPr/>
             </p:nvPicPr>
             <p:blipFill>
-              <a:blip r:embed="rId16"/>
+              <a:blip r:embed="rId15"/>
               <a:stretch>
                 <a:fillRect/>
               </a:stretch>
@@ -5969,7 +5985,7 @@
             <p:nvPr userDrawn="1"/>
           </p:nvPicPr>
           <p:blipFill>
-            <a:blip r:embed="rId17" cstate="print">
+            <a:blip r:embed="rId16" cstate="print">
               <a:extLst>
                 <a:ext uri="{28A0092B-C50C-407E-A947-70E740481C1C}">
                   <a14:useLocalDpi xmlns:a14="http://schemas.microsoft.com/office/drawing/2010/main" val="0"/>
@@ -5999,7 +6015,7 @@
             <p:nvPr userDrawn="1"/>
           </p:nvPicPr>
           <p:blipFill>
-            <a:blip r:embed="rId18" cstate="print">
+            <a:blip r:embed="rId17" cstate="print">
               <a:extLst>
                 <a:ext uri="{28A0092B-C50C-407E-A947-70E740481C1C}">
                   <a14:useLocalDpi xmlns:a14="http://schemas.microsoft.com/office/drawing/2010/main" val="0"/>
@@ -6723,7 +6739,7 @@
           <a:p>
             <a:fld id="{C3E7B4AA-2A30-485C-AB14-4F6EF9C89897}" type="datetimeFigureOut">
               <a:rPr lang="en-GB" smtClean="0"/>
-              <a:t>08/03/2020</a:t>
+              <a:t>10/03/2020</a:t>
             </a:fld>
             <a:endParaRPr lang="en-GB"/>
           </a:p>
@@ -6813,7 +6829,7 @@
           <a:p>
             <a:fld id="{50DCA0E4-055D-4D79-BDF8-BB27C910D4FA}" type="slidenum">
               <a:rPr lang="en-GB" smtClean="0"/>
-              <a:t>‹nr.›</a:t>
+              <a:t>‹#›</a:t>
             </a:fld>
             <a:endParaRPr lang="en-GB"/>
           </a:p>
@@ -7467,15 +7483,6 @@
           <a:solidFill>
             <a:srgbClr val="FFFFFF"/>
           </a:solidFill>
-          <a:extLst>
-            <a:ext uri="{909E8E84-426E-40DD-AFC4-6F175D3DCCD1}">
-              <a14:hiddenFill xmlns:a14="http://schemas.microsoft.com/office/drawing/2010/main">
-                <a:solidFill>
-                  <a:srgbClr val="FFFFFF"/>
-                </a:solidFill>
-              </a14:hiddenFill>
-            </a:ext>
-          </a:extLst>
         </p:spPr>
       </p:pic>
     </p:spTree>

</xml_diff>